<commit_message>
final changes to demo presentation
</commit_message>
<xml_diff>
--- a/Documentation/Demo.pptx
+++ b/Documentation/Demo.pptx
@@ -21,7 +21,8 @@
     <p:sldId id="268" r:id="rId15"/>
     <p:sldId id="270" r:id="rId16"/>
     <p:sldId id="271" r:id="rId17"/>
-    <p:sldId id="269" r:id="rId18"/>
+    <p:sldId id="273" r:id="rId18"/>
+    <p:sldId id="269" r:id="rId19"/>
   </p:sldIdLst>
   <p:sldSz cx="12192000" cy="6858000"/>
   <p:notesSz cx="6858000" cy="9144000"/>
@@ -3929,7 +3930,7 @@
 <dgm:dataModel xmlns:dgm="http://schemas.openxmlformats.org/drawingml/2006/diagram" xmlns:a="http://schemas.openxmlformats.org/drawingml/2006/main">
   <dgm:ptLst>
     <dgm:pt modelId="{EE45BE01-A501-4734-9FE4-E0339AF3507B}" type="doc">
-      <dgm:prSet loTypeId="urn:microsoft.com/office/officeart/2005/8/layout/list1" loCatId="list" qsTypeId="urn:microsoft.com/office/officeart/2005/8/quickstyle/simple1" qsCatId="simple" csTypeId="urn:microsoft.com/office/officeart/2005/8/colors/colorful2" csCatId="colorful"/>
+      <dgm:prSet loTypeId="urn:microsoft.com/office/officeart/2005/8/layout/list1" loCatId="list" qsTypeId="urn:microsoft.com/office/officeart/2005/8/quickstyle/simple1" qsCatId="simple" csTypeId="urn:microsoft.com/office/officeart/2005/8/colors/colorful2" csCatId="colorful" phldr="1"/>
       <dgm:spPr/>
       <dgm:t>
         <a:bodyPr/>
@@ -4073,42 +4074,6 @@
       </dgm:t>
     </dgm:pt>
     <dgm:pt modelId="{8AAB3559-19C9-4969-A4D7-4B0501593404}" type="sibTrans" cxnId="{19D51453-EBAD-4696-BE60-FC2DAA7728B4}">
-      <dgm:prSet/>
-      <dgm:spPr/>
-      <dgm:t>
-        <a:bodyPr/>
-        <a:lstStyle/>
-        <a:p>
-          <a:endParaRPr lang="en-US"/>
-        </a:p>
-      </dgm:t>
-    </dgm:pt>
-    <dgm:pt modelId="{62D96BFC-C8B6-4DCB-8661-2F4FD909847F}">
-      <dgm:prSet/>
-      <dgm:spPr/>
-      <dgm:t>
-        <a:bodyPr/>
-        <a:lstStyle/>
-        <a:p>
-          <a:r>
-            <a:rPr lang="en-US"/>
-            <a:t>Signatures provide Authentication</a:t>
-          </a:r>
-        </a:p>
-      </dgm:t>
-    </dgm:pt>
-    <dgm:pt modelId="{A19E6C96-2FC8-4E7D-8BAA-3B52E02CD330}" type="parTrans" cxnId="{5F9F1CD4-B6FC-4D6C-A286-4CB8B174F084}">
-      <dgm:prSet/>
-      <dgm:spPr/>
-      <dgm:t>
-        <a:bodyPr/>
-        <a:lstStyle/>
-        <a:p>
-          <a:endParaRPr lang="en-US"/>
-        </a:p>
-      </dgm:t>
-    </dgm:pt>
-    <dgm:pt modelId="{D78CC0F2-A938-439A-A064-0619A0598B1B}" type="sibTrans" cxnId="{5F9F1CD4-B6FC-4D6C-A286-4CB8B174F084}">
       <dgm:prSet/>
       <dgm:spPr/>
       <dgm:t>
@@ -4366,7 +4331,7 @@
         <a:lstStyle/>
         <a:p>
           <a:r>
-            <a:rPr lang="en-US"/>
+            <a:rPr lang="en-US" dirty="0"/>
             <a:t>Private Key is (d, N)</a:t>
           </a:r>
         </a:p>
@@ -4384,6 +4349,42 @@
       </dgm:t>
     </dgm:pt>
     <dgm:pt modelId="{2E07D176-A988-4FE4-8500-275C84027218}" type="sibTrans" cxnId="{34EDD96C-3250-4481-A349-228125168FCF}">
+      <dgm:prSet/>
+      <dgm:spPr/>
+      <dgm:t>
+        <a:bodyPr/>
+        <a:lstStyle/>
+        <a:p>
+          <a:endParaRPr lang="en-US"/>
+        </a:p>
+      </dgm:t>
+    </dgm:pt>
+    <dgm:pt modelId="{5BF806F1-7AB6-4A7F-9485-4DF5BBDCC28C}">
+      <dgm:prSet/>
+      <dgm:spPr/>
+      <dgm:t>
+        <a:bodyPr/>
+        <a:lstStyle/>
+        <a:p>
+          <a:r>
+            <a:rPr lang="en-US" dirty="0"/>
+            <a:t>Signatures Provide Authentication</a:t>
+          </a:r>
+        </a:p>
+      </dgm:t>
+    </dgm:pt>
+    <dgm:pt modelId="{6DF08BA3-66E1-41F3-B44F-FC5B306C4663}" type="parTrans" cxnId="{85424763-0B39-4143-B041-19BACB0F9B88}">
+      <dgm:prSet/>
+      <dgm:spPr/>
+      <dgm:t>
+        <a:bodyPr/>
+        <a:lstStyle/>
+        <a:p>
+          <a:endParaRPr lang="en-US"/>
+        </a:p>
+      </dgm:t>
+    </dgm:pt>
+    <dgm:pt modelId="{C8B454EA-096F-4D81-8C15-C91DA5048F68}" type="sibTrans" cxnId="{85424763-0B39-4143-B041-19BACB0F9B88}">
       <dgm:prSet/>
       <dgm:spPr/>
       <dgm:t>
@@ -4470,49 +4471,16 @@
       <dgm:prSet presAssocID="{43DC984C-8901-4776-A967-823B6DB23DA7}" presName="spaceBetweenRectangles" presStyleCnt="0"/>
       <dgm:spPr/>
     </dgm:pt>
-    <dgm:pt modelId="{EC810A11-C200-4594-90AF-CF35A84F253E}" type="pres">
-      <dgm:prSet presAssocID="{62D96BFC-C8B6-4DCB-8661-2F4FD909847F}" presName="parentLin" presStyleCnt="0"/>
-      <dgm:spPr/>
-    </dgm:pt>
-    <dgm:pt modelId="{83E4D972-6DD9-4573-97B9-E27C87DE69EB}" type="pres">
-      <dgm:prSet presAssocID="{62D96BFC-C8B6-4DCB-8661-2F4FD909847F}" presName="parentLeftMargin" presStyleLbl="node1" presStyleIdx="1" presStyleCnt="4"/>
-      <dgm:spPr/>
-    </dgm:pt>
-    <dgm:pt modelId="{0E2A3238-6B15-4C23-9F63-4D66B75A647B}" type="pres">
-      <dgm:prSet presAssocID="{62D96BFC-C8B6-4DCB-8661-2F4FD909847F}" presName="parentText" presStyleLbl="node1" presStyleIdx="2" presStyleCnt="4">
-        <dgm:presLayoutVars>
-          <dgm:chMax val="0"/>
-          <dgm:bulletEnabled val="1"/>
-        </dgm:presLayoutVars>
-      </dgm:prSet>
-      <dgm:spPr/>
-    </dgm:pt>
-    <dgm:pt modelId="{03402540-006B-4F09-9C97-BC583565412B}" type="pres">
-      <dgm:prSet presAssocID="{62D96BFC-C8B6-4DCB-8661-2F4FD909847F}" presName="negativeSpace" presStyleCnt="0"/>
-      <dgm:spPr/>
-    </dgm:pt>
-    <dgm:pt modelId="{DC6D3A3D-00C3-426F-8114-F13CEAB9273D}" type="pres">
-      <dgm:prSet presAssocID="{62D96BFC-C8B6-4DCB-8661-2F4FD909847F}" presName="childText" presStyleLbl="conFgAcc1" presStyleIdx="2" presStyleCnt="4">
-        <dgm:presLayoutVars>
-          <dgm:bulletEnabled val="1"/>
-        </dgm:presLayoutVars>
-      </dgm:prSet>
-      <dgm:spPr/>
-    </dgm:pt>
-    <dgm:pt modelId="{5D8DA876-DB0A-433F-A84E-69A2F29AB82A}" type="pres">
-      <dgm:prSet presAssocID="{D78CC0F2-A938-439A-A064-0619A0598B1B}" presName="spaceBetweenRectangles" presStyleCnt="0"/>
-      <dgm:spPr/>
-    </dgm:pt>
     <dgm:pt modelId="{D40F3103-8644-4915-AEB4-C861B13ACC70}" type="pres">
       <dgm:prSet presAssocID="{CD59C50F-6F64-4C5B-BFB3-793F144661CA}" presName="parentLin" presStyleCnt="0"/>
       <dgm:spPr/>
     </dgm:pt>
     <dgm:pt modelId="{9C9F0C77-32FD-4256-AEED-D1C29A2F94BF}" type="pres">
-      <dgm:prSet presAssocID="{CD59C50F-6F64-4C5B-BFB3-793F144661CA}" presName="parentLeftMargin" presStyleLbl="node1" presStyleIdx="2" presStyleCnt="4"/>
+      <dgm:prSet presAssocID="{CD59C50F-6F64-4C5B-BFB3-793F144661CA}" presName="parentLeftMargin" presStyleLbl="node1" presStyleIdx="1" presStyleCnt="4"/>
       <dgm:spPr/>
     </dgm:pt>
     <dgm:pt modelId="{E5AE72C9-AF08-403A-82CB-0709F71DDBD0}" type="pres">
-      <dgm:prSet presAssocID="{CD59C50F-6F64-4C5B-BFB3-793F144661CA}" presName="parentText" presStyleLbl="node1" presStyleIdx="3" presStyleCnt="4">
+      <dgm:prSet presAssocID="{CD59C50F-6F64-4C5B-BFB3-793F144661CA}" presName="parentText" presStyleLbl="node1" presStyleIdx="2" presStyleCnt="4">
         <dgm:presLayoutVars>
           <dgm:chMax val="0"/>
           <dgm:bulletEnabled val="1"/>
@@ -4525,7 +4493,40 @@
       <dgm:spPr/>
     </dgm:pt>
     <dgm:pt modelId="{971FB27F-3F15-4375-A5C6-686B1B2B681E}" type="pres">
-      <dgm:prSet presAssocID="{CD59C50F-6F64-4C5B-BFB3-793F144661CA}" presName="childText" presStyleLbl="conFgAcc1" presStyleIdx="3" presStyleCnt="4">
+      <dgm:prSet presAssocID="{CD59C50F-6F64-4C5B-BFB3-793F144661CA}" presName="childText" presStyleLbl="conFgAcc1" presStyleIdx="2" presStyleCnt="4">
+        <dgm:presLayoutVars>
+          <dgm:bulletEnabled val="1"/>
+        </dgm:presLayoutVars>
+      </dgm:prSet>
+      <dgm:spPr/>
+    </dgm:pt>
+    <dgm:pt modelId="{CCFE1B7C-3A35-42FF-8988-BD3DCAF8B25A}" type="pres">
+      <dgm:prSet presAssocID="{4790B5B4-8655-4997-9293-A00DE7DC5632}" presName="spaceBetweenRectangles" presStyleCnt="0"/>
+      <dgm:spPr/>
+    </dgm:pt>
+    <dgm:pt modelId="{DEC7C23D-BC79-4859-8A66-2B2436E03626}" type="pres">
+      <dgm:prSet presAssocID="{5BF806F1-7AB6-4A7F-9485-4DF5BBDCC28C}" presName="parentLin" presStyleCnt="0"/>
+      <dgm:spPr/>
+    </dgm:pt>
+    <dgm:pt modelId="{DFC5872C-87F4-4BC1-838D-6FC39553D6C3}" type="pres">
+      <dgm:prSet presAssocID="{5BF806F1-7AB6-4A7F-9485-4DF5BBDCC28C}" presName="parentLeftMargin" presStyleLbl="node1" presStyleIdx="2" presStyleCnt="4"/>
+      <dgm:spPr/>
+    </dgm:pt>
+    <dgm:pt modelId="{57014F90-1C5A-49B8-A04D-4D3425AE464C}" type="pres">
+      <dgm:prSet presAssocID="{5BF806F1-7AB6-4A7F-9485-4DF5BBDCC28C}" presName="parentText" presStyleLbl="node1" presStyleIdx="3" presStyleCnt="4">
+        <dgm:presLayoutVars>
+          <dgm:chMax val="0"/>
+          <dgm:bulletEnabled val="1"/>
+        </dgm:presLayoutVars>
+      </dgm:prSet>
+      <dgm:spPr/>
+    </dgm:pt>
+    <dgm:pt modelId="{ECCFD513-8C81-45DA-A330-15105B3E68D8}" type="pres">
+      <dgm:prSet presAssocID="{5BF806F1-7AB6-4A7F-9485-4DF5BBDCC28C}" presName="negativeSpace" presStyleCnt="0"/>
+      <dgm:spPr/>
+    </dgm:pt>
+    <dgm:pt modelId="{30CAFB56-436F-4AA5-99ED-B1722B039BBC}" type="pres">
+      <dgm:prSet presAssocID="{5BF806F1-7AB6-4A7F-9485-4DF5BBDCC28C}" presName="childText" presStyleLbl="conFgAcc1" presStyleIdx="3" presStyleCnt="4">
         <dgm:presLayoutVars>
           <dgm:bulletEnabled val="1"/>
         </dgm:presLayoutVars>
@@ -4536,29 +4537,29 @@
   <dgm:cxnLst>
     <dgm:cxn modelId="{0A47A10D-667A-4A61-90E3-592DFBBF4C43}" type="presOf" srcId="{0F0A88C6-2C62-4A18-99A9-8388B27833CC}" destId="{971FB27F-3F15-4375-A5C6-686B1B2B681E}" srcOrd="0" destOrd="3" presId="urn:microsoft.com/office/officeart/2005/8/layout/list1"/>
     <dgm:cxn modelId="{28D1211A-E9DA-4400-9580-4BF8E4460518}" srcId="{15258864-4318-414D-992E-EEEECE4DB5AD}" destId="{C10B1F5D-EDA4-475F-B00A-78F46209EA77}" srcOrd="0" destOrd="0" parTransId="{34906460-3C29-421A-98F7-C7A005323F2D}" sibTransId="{201E81C2-E35D-4773-B641-C6A1930E707D}"/>
-    <dgm:cxn modelId="{558F8E22-7BF3-46B2-9223-41CD3CCDED0E}" srcId="{EE45BE01-A501-4734-9FE4-E0339AF3507B}" destId="{CD59C50F-6F64-4C5B-BFB3-793F144661CA}" srcOrd="3" destOrd="0" parTransId="{C587297D-9DDF-41C2-8271-70CA67588F9C}" sibTransId="{4790B5B4-8655-4997-9293-A00DE7DC5632}"/>
+    <dgm:cxn modelId="{558F8E22-7BF3-46B2-9223-41CD3CCDED0E}" srcId="{EE45BE01-A501-4734-9FE4-E0339AF3507B}" destId="{CD59C50F-6F64-4C5B-BFB3-793F144661CA}" srcOrd="2" destOrd="0" parTransId="{C587297D-9DDF-41C2-8271-70CA67588F9C}" sibTransId="{4790B5B4-8655-4997-9293-A00DE7DC5632}"/>
     <dgm:cxn modelId="{360ED326-9BC1-4F2D-99B5-ED7FBDFAB16D}" type="presOf" srcId="{50E3A7EB-393A-4967-919D-61965A36BC52}" destId="{446058A2-F42F-4AA4-BF8A-4530EF7A7958}" srcOrd="1" destOrd="0" presId="urn:microsoft.com/office/officeart/2005/8/layout/list1"/>
     <dgm:cxn modelId="{B05D2637-3DF9-4E72-B924-E961B4EF9A33}" type="presOf" srcId="{EE45BE01-A501-4734-9FE4-E0339AF3507B}" destId="{35CE06E7-4866-4BF9-A5B5-6A02B236CE31}" srcOrd="0" destOrd="0" presId="urn:microsoft.com/office/officeart/2005/8/layout/list1"/>
+    <dgm:cxn modelId="{85424763-0B39-4143-B041-19BACB0F9B88}" srcId="{EE45BE01-A501-4734-9FE4-E0339AF3507B}" destId="{5BF806F1-7AB6-4A7F-9485-4DF5BBDCC28C}" srcOrd="3" destOrd="0" parTransId="{6DF08BA3-66E1-41F3-B44F-FC5B306C4663}" sibTransId="{C8B454EA-096F-4D81-8C15-C91DA5048F68}"/>
+    <dgm:cxn modelId="{BEEC3644-CA6C-4321-95C2-53F85335427A}" type="presOf" srcId="{5BF806F1-7AB6-4A7F-9485-4DF5BBDCC28C}" destId="{DFC5872C-87F4-4BC1-838D-6FC39553D6C3}" srcOrd="0" destOrd="0" presId="urn:microsoft.com/office/officeart/2005/8/layout/list1"/>
     <dgm:cxn modelId="{84DE2666-332E-4C14-83B1-B8F6CDD2F73A}" srcId="{CD59C50F-6F64-4C5B-BFB3-793F144661CA}" destId="{55E2D40E-5496-4E10-9831-2F158A739A6D}" srcOrd="1" destOrd="0" parTransId="{F0BC116F-6F20-4882-8E49-77C6A4EF28AB}" sibTransId="{A85F8705-6D25-4DAD-84BD-E51C6DE1E55B}"/>
     <dgm:cxn modelId="{D8BACE68-916E-4F78-AE6A-72247E6A58B8}" type="presOf" srcId="{15258864-4318-414D-992E-EEEECE4DB5AD}" destId="{4B34BF44-2077-4452-9DD2-8D02E250A006}" srcOrd="1" destOrd="0" presId="urn:microsoft.com/office/officeart/2005/8/layout/list1"/>
     <dgm:cxn modelId="{34EDD96C-3250-4481-A349-228125168FCF}" srcId="{CD59C50F-6F64-4C5B-BFB3-793F144661CA}" destId="{0F0A88C6-2C62-4A18-99A9-8388B27833CC}" srcOrd="3" destOrd="0" parTransId="{74B9F4E2-F6F1-40FD-8B1F-52C19FBDD5EE}" sibTransId="{2E07D176-A988-4FE4-8500-275C84027218}"/>
     <dgm:cxn modelId="{19D51453-EBAD-4696-BE60-FC2DAA7728B4}" srcId="{15258864-4318-414D-992E-EEEECE4DB5AD}" destId="{8DC8EE8D-A93E-4099-8859-00B51FD13FB1}" srcOrd="1" destOrd="0" parTransId="{6519D11D-AC43-4FC0-9997-FC0A27B7632A}" sibTransId="{8AAB3559-19C9-4969-A4D7-4B0501593404}"/>
-    <dgm:cxn modelId="{068F3E84-5D13-4789-A8FB-235C8FCB8F80}" type="presOf" srcId="{62D96BFC-C8B6-4DCB-8661-2F4FD909847F}" destId="{83E4D972-6DD9-4573-97B9-E27C87DE69EB}" srcOrd="0" destOrd="0" presId="urn:microsoft.com/office/officeart/2005/8/layout/list1"/>
     <dgm:cxn modelId="{0D660F94-28FE-4888-84FB-088E1749A19B}" type="presOf" srcId="{CD59C50F-6F64-4C5B-BFB3-793F144661CA}" destId="{E5AE72C9-AF08-403A-82CB-0709F71DDBD0}" srcOrd="1" destOrd="0" presId="urn:microsoft.com/office/officeart/2005/8/layout/list1"/>
     <dgm:cxn modelId="{606CF094-AD48-4B95-B838-4E130B68A782}" srcId="{EE45BE01-A501-4734-9FE4-E0339AF3507B}" destId="{50E3A7EB-393A-4967-919D-61965A36BC52}" srcOrd="0" destOrd="0" parTransId="{CF73811D-CADF-42FC-A84E-A09864A46BBE}" sibTransId="{451E3817-D3B2-40AB-961A-072C857BDA34}"/>
     <dgm:cxn modelId="{F19ABA95-6CE9-424D-BA40-33A1C4372E35}" type="presOf" srcId="{8DC8EE8D-A93E-4099-8859-00B51FD13FB1}" destId="{EC8F1652-EF36-4881-B168-A5FCD5BE0A72}" srcOrd="0" destOrd="1" presId="urn:microsoft.com/office/officeart/2005/8/layout/list1"/>
     <dgm:cxn modelId="{1B375096-E1E0-434B-AF5C-9D40B6835F4F}" srcId="{CD59C50F-6F64-4C5B-BFB3-793F144661CA}" destId="{0E15C337-8908-40D0-B900-D55505DC132E}" srcOrd="2" destOrd="0" parTransId="{4420B6B8-9D61-4FAB-8611-F37C4FE66F39}" sibTransId="{FE54107C-0CCF-469C-90B4-B342E83587C1}"/>
     <dgm:cxn modelId="{50B1FA9B-4BC2-4B4B-A9EC-EBDF1FF1830F}" type="presOf" srcId="{55E2D40E-5496-4E10-9831-2F158A739A6D}" destId="{971FB27F-3F15-4375-A5C6-686B1B2B681E}" srcOrd="0" destOrd="1" presId="urn:microsoft.com/office/officeart/2005/8/layout/list1"/>
+    <dgm:cxn modelId="{26D5E9B7-9E2F-4A11-994A-9832CA18295B}" type="presOf" srcId="{5BF806F1-7AB6-4A7F-9485-4DF5BBDCC28C}" destId="{57014F90-1C5A-49B8-A04D-4D3425AE464C}" srcOrd="1" destOrd="0" presId="urn:microsoft.com/office/officeart/2005/8/layout/list1"/>
     <dgm:cxn modelId="{5D91F3B9-C9D7-4162-8DA5-37745016859D}" type="presOf" srcId="{50E3A7EB-393A-4967-919D-61965A36BC52}" destId="{E7974F1E-CEF1-40DA-8680-4DBF5851C6CF}" srcOrd="0" destOrd="0" presId="urn:microsoft.com/office/officeart/2005/8/layout/list1"/>
     <dgm:cxn modelId="{499461BD-6619-4591-8AAD-39F49729CA5E}" type="presOf" srcId="{CD59C50F-6F64-4C5B-BFB3-793F144661CA}" destId="{9C9F0C77-32FD-4256-AEED-D1C29A2F94BF}" srcOrd="0" destOrd="0" presId="urn:microsoft.com/office/officeart/2005/8/layout/list1"/>
     <dgm:cxn modelId="{94DBEEBF-23B4-4816-B7CA-6B0CD2473DBA}" type="presOf" srcId="{15258864-4318-414D-992E-EEEECE4DB5AD}" destId="{70C6F061-4CB2-47CF-AC00-BCDEF22DF6CE}" srcOrd="0" destOrd="0" presId="urn:microsoft.com/office/officeart/2005/8/layout/list1"/>
     <dgm:cxn modelId="{1C1F15C1-0C58-46CE-B6B1-FF229CEFCB3E}" type="presOf" srcId="{EC450DAA-C80C-48F9-AF0B-A83AB3D97D43}" destId="{971FB27F-3F15-4375-A5C6-686B1B2B681E}" srcOrd="0" destOrd="0" presId="urn:microsoft.com/office/officeart/2005/8/layout/list1"/>
-    <dgm:cxn modelId="{5F9F1CD4-B6FC-4D6C-A286-4CB8B174F084}" srcId="{EE45BE01-A501-4734-9FE4-E0339AF3507B}" destId="{62D96BFC-C8B6-4DCB-8661-2F4FD909847F}" srcOrd="2" destOrd="0" parTransId="{A19E6C96-2FC8-4E7D-8BAA-3B52E02CD330}" sibTransId="{D78CC0F2-A938-439A-A064-0619A0598B1B}"/>
     <dgm:cxn modelId="{B1ABFDD9-BE3D-4213-8C5A-2668B55020AA}" srcId="{EE45BE01-A501-4734-9FE4-E0339AF3507B}" destId="{15258864-4318-414D-992E-EEEECE4DB5AD}" srcOrd="1" destOrd="0" parTransId="{D132DDED-5DD6-4881-86D7-B536657BCE12}" sibTransId="{43DC984C-8901-4776-A967-823B6DB23DA7}"/>
     <dgm:cxn modelId="{AE133CEA-2A05-4C73-9007-7BA5AEC3FF8D}" srcId="{CD59C50F-6F64-4C5B-BFB3-793F144661CA}" destId="{EC450DAA-C80C-48F9-AF0B-A83AB3D97D43}" srcOrd="0" destOrd="0" parTransId="{1B688020-A8DC-44AB-B571-096499ACCC0C}" sibTransId="{E5CE0618-BD58-4639-B4B1-87FF90C39C3E}"/>
     <dgm:cxn modelId="{5F78B3EC-90E3-4B56-B2C6-F0CE9003018F}" type="presOf" srcId="{0E15C337-8908-40D0-B900-D55505DC132E}" destId="{971FB27F-3F15-4375-A5C6-686B1B2B681E}" srcOrd="0" destOrd="2" presId="urn:microsoft.com/office/officeart/2005/8/layout/list1"/>
     <dgm:cxn modelId="{5E7081F4-A91C-44BE-8E0D-6F3D05CA500F}" type="presOf" srcId="{C10B1F5D-EDA4-475F-B00A-78F46209EA77}" destId="{EC8F1652-EF36-4881-B168-A5FCD5BE0A72}" srcOrd="0" destOrd="0" presId="urn:microsoft.com/office/officeart/2005/8/layout/list1"/>
-    <dgm:cxn modelId="{1C8D42F8-918D-4D3E-A670-F0350E6E9CEA}" type="presOf" srcId="{62D96BFC-C8B6-4DCB-8661-2F4FD909847F}" destId="{0E2A3238-6B15-4C23-9F63-4D66B75A647B}" srcOrd="1" destOrd="0" presId="urn:microsoft.com/office/officeart/2005/8/layout/list1"/>
     <dgm:cxn modelId="{85BFAD40-E35A-4FFD-819C-2F98CA856A28}" type="presParOf" srcId="{35CE06E7-4866-4BF9-A5B5-6A02B236CE31}" destId="{45DE2339-CADC-44BF-983E-EDFB6DEE29A0}" srcOrd="0" destOrd="0" presId="urn:microsoft.com/office/officeart/2005/8/layout/list1"/>
     <dgm:cxn modelId="{40A159EE-37FD-44D1-BAEA-89157C1F0906}" type="presParOf" srcId="{45DE2339-CADC-44BF-983E-EDFB6DEE29A0}" destId="{E7974F1E-CEF1-40DA-8680-4DBF5851C6CF}" srcOrd="0" destOrd="0" presId="urn:microsoft.com/office/officeart/2005/8/layout/list1"/>
     <dgm:cxn modelId="{4AB9DB49-93B4-4A3E-8DF7-544C9D28C745}" type="presParOf" srcId="{45DE2339-CADC-44BF-983E-EDFB6DEE29A0}" destId="{446058A2-F42F-4AA4-BF8A-4530EF7A7958}" srcOrd="1" destOrd="0" presId="urn:microsoft.com/office/officeart/2005/8/layout/list1"/>
@@ -4571,17 +4572,17 @@
     <dgm:cxn modelId="{FA9C598E-B1EA-4C18-BD9D-336E54AD523A}" type="presParOf" srcId="{35CE06E7-4866-4BF9-A5B5-6A02B236CE31}" destId="{D65252B5-1076-4CA6-864B-8D15B1B54171}" srcOrd="5" destOrd="0" presId="urn:microsoft.com/office/officeart/2005/8/layout/list1"/>
     <dgm:cxn modelId="{1EBFA692-82B9-48CE-9AAB-28ED434EA041}" type="presParOf" srcId="{35CE06E7-4866-4BF9-A5B5-6A02B236CE31}" destId="{EC8F1652-EF36-4881-B168-A5FCD5BE0A72}" srcOrd="6" destOrd="0" presId="urn:microsoft.com/office/officeart/2005/8/layout/list1"/>
     <dgm:cxn modelId="{D701BF50-AA12-4FAA-9F57-39449F7CEA0E}" type="presParOf" srcId="{35CE06E7-4866-4BF9-A5B5-6A02B236CE31}" destId="{222B457A-9EE9-4DFF-B4AA-FBEBA55B6C7C}" srcOrd="7" destOrd="0" presId="urn:microsoft.com/office/officeart/2005/8/layout/list1"/>
-    <dgm:cxn modelId="{9CABCF22-38E0-4D08-8167-DDBC0525E65A}" type="presParOf" srcId="{35CE06E7-4866-4BF9-A5B5-6A02B236CE31}" destId="{EC810A11-C200-4594-90AF-CF35A84F253E}" srcOrd="8" destOrd="0" presId="urn:microsoft.com/office/officeart/2005/8/layout/list1"/>
-    <dgm:cxn modelId="{90A0F3D7-8627-45C5-9E4A-813DE27726F5}" type="presParOf" srcId="{EC810A11-C200-4594-90AF-CF35A84F253E}" destId="{83E4D972-6DD9-4573-97B9-E27C87DE69EB}" srcOrd="0" destOrd="0" presId="urn:microsoft.com/office/officeart/2005/8/layout/list1"/>
-    <dgm:cxn modelId="{E02D909E-7C81-4A35-8B17-53A0093F9CD9}" type="presParOf" srcId="{EC810A11-C200-4594-90AF-CF35A84F253E}" destId="{0E2A3238-6B15-4C23-9F63-4D66B75A647B}" srcOrd="1" destOrd="0" presId="urn:microsoft.com/office/officeart/2005/8/layout/list1"/>
-    <dgm:cxn modelId="{853C2186-AF00-4FB5-80ED-7BDD00AD6DC9}" type="presParOf" srcId="{35CE06E7-4866-4BF9-A5B5-6A02B236CE31}" destId="{03402540-006B-4F09-9C97-BC583565412B}" srcOrd="9" destOrd="0" presId="urn:microsoft.com/office/officeart/2005/8/layout/list1"/>
-    <dgm:cxn modelId="{B67B3543-E200-4085-B43A-E576D715CE83}" type="presParOf" srcId="{35CE06E7-4866-4BF9-A5B5-6A02B236CE31}" destId="{DC6D3A3D-00C3-426F-8114-F13CEAB9273D}" srcOrd="10" destOrd="0" presId="urn:microsoft.com/office/officeart/2005/8/layout/list1"/>
-    <dgm:cxn modelId="{86E0F4B7-E8D7-4775-8208-B48DDF682AC2}" type="presParOf" srcId="{35CE06E7-4866-4BF9-A5B5-6A02B236CE31}" destId="{5D8DA876-DB0A-433F-A84E-69A2F29AB82A}" srcOrd="11" destOrd="0" presId="urn:microsoft.com/office/officeart/2005/8/layout/list1"/>
-    <dgm:cxn modelId="{1528F338-F220-42B5-B54E-F0BE554C4742}" type="presParOf" srcId="{35CE06E7-4866-4BF9-A5B5-6A02B236CE31}" destId="{D40F3103-8644-4915-AEB4-C861B13ACC70}" srcOrd="12" destOrd="0" presId="urn:microsoft.com/office/officeart/2005/8/layout/list1"/>
+    <dgm:cxn modelId="{1528F338-F220-42B5-B54E-F0BE554C4742}" type="presParOf" srcId="{35CE06E7-4866-4BF9-A5B5-6A02B236CE31}" destId="{D40F3103-8644-4915-AEB4-C861B13ACC70}" srcOrd="8" destOrd="0" presId="urn:microsoft.com/office/officeart/2005/8/layout/list1"/>
     <dgm:cxn modelId="{2494BDC6-95C7-48F8-8729-BD75862894B1}" type="presParOf" srcId="{D40F3103-8644-4915-AEB4-C861B13ACC70}" destId="{9C9F0C77-32FD-4256-AEED-D1C29A2F94BF}" srcOrd="0" destOrd="0" presId="urn:microsoft.com/office/officeart/2005/8/layout/list1"/>
     <dgm:cxn modelId="{45F60FC2-BE87-4141-B9CF-F9BA8E1ED37A}" type="presParOf" srcId="{D40F3103-8644-4915-AEB4-C861B13ACC70}" destId="{E5AE72C9-AF08-403A-82CB-0709F71DDBD0}" srcOrd="1" destOrd="0" presId="urn:microsoft.com/office/officeart/2005/8/layout/list1"/>
-    <dgm:cxn modelId="{1D3155B0-51A2-409E-AD31-ED6BA1687505}" type="presParOf" srcId="{35CE06E7-4866-4BF9-A5B5-6A02B236CE31}" destId="{1A9E449E-A33A-441A-806E-FA9D6CA9DC88}" srcOrd="13" destOrd="0" presId="urn:microsoft.com/office/officeart/2005/8/layout/list1"/>
-    <dgm:cxn modelId="{DC8C32C6-CCF2-4D75-9476-6E9285DC2EA8}" type="presParOf" srcId="{35CE06E7-4866-4BF9-A5B5-6A02B236CE31}" destId="{971FB27F-3F15-4375-A5C6-686B1B2B681E}" srcOrd="14" destOrd="0" presId="urn:microsoft.com/office/officeart/2005/8/layout/list1"/>
+    <dgm:cxn modelId="{1D3155B0-51A2-409E-AD31-ED6BA1687505}" type="presParOf" srcId="{35CE06E7-4866-4BF9-A5B5-6A02B236CE31}" destId="{1A9E449E-A33A-441A-806E-FA9D6CA9DC88}" srcOrd="9" destOrd="0" presId="urn:microsoft.com/office/officeart/2005/8/layout/list1"/>
+    <dgm:cxn modelId="{DC8C32C6-CCF2-4D75-9476-6E9285DC2EA8}" type="presParOf" srcId="{35CE06E7-4866-4BF9-A5B5-6A02B236CE31}" destId="{971FB27F-3F15-4375-A5C6-686B1B2B681E}" srcOrd="10" destOrd="0" presId="urn:microsoft.com/office/officeart/2005/8/layout/list1"/>
+    <dgm:cxn modelId="{4976969B-176B-409F-9872-A65913F139C3}" type="presParOf" srcId="{35CE06E7-4866-4BF9-A5B5-6A02B236CE31}" destId="{CCFE1B7C-3A35-42FF-8988-BD3DCAF8B25A}" srcOrd="11" destOrd="0" presId="urn:microsoft.com/office/officeart/2005/8/layout/list1"/>
+    <dgm:cxn modelId="{43BC4300-8BF8-43DF-8CE9-2AB3B613272C}" type="presParOf" srcId="{35CE06E7-4866-4BF9-A5B5-6A02B236CE31}" destId="{DEC7C23D-BC79-4859-8A66-2B2436E03626}" srcOrd="12" destOrd="0" presId="urn:microsoft.com/office/officeart/2005/8/layout/list1"/>
+    <dgm:cxn modelId="{5B345A4F-7653-4F52-BBC1-A5433876642C}" type="presParOf" srcId="{DEC7C23D-BC79-4859-8A66-2B2436E03626}" destId="{DFC5872C-87F4-4BC1-838D-6FC39553D6C3}" srcOrd="0" destOrd="0" presId="urn:microsoft.com/office/officeart/2005/8/layout/list1"/>
+    <dgm:cxn modelId="{3B129401-7473-4379-924E-F69AC8A33547}" type="presParOf" srcId="{DEC7C23D-BC79-4859-8A66-2B2436E03626}" destId="{57014F90-1C5A-49B8-A04D-4D3425AE464C}" srcOrd="1" destOrd="0" presId="urn:microsoft.com/office/officeart/2005/8/layout/list1"/>
+    <dgm:cxn modelId="{F0A2C702-52C2-4597-9E78-8D763CBB2C2B}" type="presParOf" srcId="{35CE06E7-4866-4BF9-A5B5-6A02B236CE31}" destId="{ECCFD513-8C81-45DA-A330-15105B3E68D8}" srcOrd="13" destOrd="0" presId="urn:microsoft.com/office/officeart/2005/8/layout/list1"/>
+    <dgm:cxn modelId="{FF54E2A9-3D98-4B12-9C56-CC96ADAACCAB}" type="presParOf" srcId="{35CE06E7-4866-4BF9-A5B5-6A02B236CE31}" destId="{30CAFB56-436F-4AA5-99ED-B1722B039BBC}" srcOrd="14" destOrd="0" presId="urn:microsoft.com/office/officeart/2005/8/layout/list1"/>
   </dgm:cxnLst>
   <dgm:bg/>
   <dgm:whole/>
@@ -5711,7 +5712,7 @@
       </dsp:nvSpPr>
       <dsp:spPr>
         <a:xfrm>
-          <a:off x="0" y="1249731"/>
+          <a:off x="0" y="1249730"/>
           <a:ext cx="6797675" cy="252000"/>
         </a:xfrm>
         <a:prstGeom prst="rect">
@@ -5759,7 +5760,7 @@
       </dsp:nvSpPr>
       <dsp:spPr>
         <a:xfrm>
-          <a:off x="339883" y="1102131"/>
+          <a:off x="339883" y="1102130"/>
           <a:ext cx="4758372" cy="295200"/>
         </a:xfrm>
         <a:prstGeom prst="roundRect">
@@ -5825,7 +5826,7 @@
         </a:p>
       </dsp:txBody>
       <dsp:txXfrm>
-        <a:off x="354293" y="1116541"/>
+        <a:off x="354293" y="1116540"/>
         <a:ext cx="4729552" cy="266380"/>
       </dsp:txXfrm>
     </dsp:sp>
@@ -5930,7 +5931,7 @@
       </dsp:nvSpPr>
       <dsp:spPr>
         <a:xfrm>
-          <a:off x="339883" y="1555731"/>
+          <a:off x="339883" y="1555730"/>
           <a:ext cx="4758372" cy="295200"/>
         </a:xfrm>
         <a:prstGeom prst="roundRect">
@@ -5996,11 +5997,11 @@
         </a:p>
       </dsp:txBody>
       <dsp:txXfrm>
-        <a:off x="354293" y="1570141"/>
+        <a:off x="354293" y="1570140"/>
         <a:ext cx="4729552" cy="266380"/>
       </dsp:txXfrm>
     </dsp:sp>
-    <dsp:sp modelId="{DC6D3A3D-00C3-426F-8114-F13CEAB9273D}">
+    <dsp:sp modelId="{971FB27F-3F15-4375-A5C6-686B1B2B681E}">
       <dsp:nvSpPr>
         <dsp:cNvPr id="0" name=""/>
         <dsp:cNvSpPr/>
@@ -6008,7 +6009,7 @@
       <dsp:spPr>
         <a:xfrm>
           <a:off x="0" y="2487681"/>
-          <a:ext cx="6797675" cy="252000"/>
+          <a:ext cx="6797675" cy="1606500"/>
         </a:xfrm>
         <a:prstGeom prst="rect">
           <a:avLst/>
@@ -6028,131 +6029,6 @@
               <a:hueOff val="26025"/>
               <a:satOff val="-17917"/>
               <a:lumOff val="-4575"/>
-              <a:alphaOff val="0"/>
-            </a:schemeClr>
-          </a:solidFill>
-          <a:prstDash val="solid"/>
-        </a:ln>
-        <a:effectLst/>
-      </dsp:spPr>
-      <dsp:style>
-        <a:lnRef idx="2">
-          <a:scrgbClr r="0" g="0" b="0"/>
-        </a:lnRef>
-        <a:fillRef idx="1">
-          <a:scrgbClr r="0" g="0" b="0"/>
-        </a:fillRef>
-        <a:effectRef idx="0">
-          <a:scrgbClr r="0" g="0" b="0"/>
-        </a:effectRef>
-        <a:fontRef idx="minor"/>
-      </dsp:style>
-    </dsp:sp>
-    <dsp:sp modelId="{0E2A3238-6B15-4C23-9F63-4D66B75A647B}">
-      <dsp:nvSpPr>
-        <dsp:cNvPr id="0" name=""/>
-        <dsp:cNvSpPr/>
-      </dsp:nvSpPr>
-      <dsp:spPr>
-        <a:xfrm>
-          <a:off x="339883" y="2340081"/>
-          <a:ext cx="4758372" cy="295200"/>
-        </a:xfrm>
-        <a:prstGeom prst="roundRect">
-          <a:avLst/>
-        </a:prstGeom>
-        <a:solidFill>
-          <a:schemeClr val="accent2">
-            <a:hueOff val="26025"/>
-            <a:satOff val="-17917"/>
-            <a:lumOff val="-4575"/>
-            <a:alphaOff val="0"/>
-          </a:schemeClr>
-        </a:solidFill>
-        <a:ln w="15875" cap="flat" cmpd="sng" algn="ctr">
-          <a:solidFill>
-            <a:schemeClr val="lt1">
-              <a:hueOff val="0"/>
-              <a:satOff val="0"/>
-              <a:lumOff val="0"/>
-              <a:alphaOff val="0"/>
-            </a:schemeClr>
-          </a:solidFill>
-          <a:prstDash val="solid"/>
-        </a:ln>
-        <a:effectLst/>
-      </dsp:spPr>
-      <dsp:style>
-        <a:lnRef idx="2">
-          <a:scrgbClr r="0" g="0" b="0"/>
-        </a:lnRef>
-        <a:fillRef idx="1">
-          <a:scrgbClr r="0" g="0" b="0"/>
-        </a:fillRef>
-        <a:effectRef idx="0">
-          <a:scrgbClr r="0" g="0" b="0"/>
-        </a:effectRef>
-        <a:fontRef idx="minor">
-          <a:schemeClr val="lt1"/>
-        </a:fontRef>
-      </dsp:style>
-      <dsp:txBody>
-        <a:bodyPr spcFirstLastPara="0" vert="horz" wrap="square" lIns="179855" tIns="0" rIns="179855" bIns="0" numCol="1" spcCol="1270" anchor="ctr" anchorCtr="0">
-          <a:noAutofit/>
-        </a:bodyPr>
-        <a:lstStyle/>
-        <a:p>
-          <a:pPr marL="0" lvl="0" indent="0" algn="l" defTabSz="444500">
-            <a:lnSpc>
-              <a:spcPct val="90000"/>
-            </a:lnSpc>
-            <a:spcBef>
-              <a:spcPct val="0"/>
-            </a:spcBef>
-            <a:spcAft>
-              <a:spcPct val="35000"/>
-            </a:spcAft>
-            <a:buNone/>
-          </a:pPr>
-          <a:r>
-            <a:rPr lang="en-US" sz="1000" kern="1200"/>
-            <a:t>Signatures provide Authentication</a:t>
-          </a:r>
-        </a:p>
-      </dsp:txBody>
-      <dsp:txXfrm>
-        <a:off x="354293" y="2354491"/>
-        <a:ext cx="4729552" cy="266380"/>
-      </dsp:txXfrm>
-    </dsp:sp>
-    <dsp:sp modelId="{971FB27F-3F15-4375-A5C6-686B1B2B681E}">
-      <dsp:nvSpPr>
-        <dsp:cNvPr id="0" name=""/>
-        <dsp:cNvSpPr/>
-      </dsp:nvSpPr>
-      <dsp:spPr>
-        <a:xfrm>
-          <a:off x="0" y="2941281"/>
-          <a:ext cx="6797675" cy="1606500"/>
-        </a:xfrm>
-        <a:prstGeom prst="rect">
-          <a:avLst/>
-        </a:prstGeom>
-        <a:solidFill>
-          <a:schemeClr val="lt1">
-            <a:alpha val="90000"/>
-            <a:hueOff val="0"/>
-            <a:satOff val="0"/>
-            <a:lumOff val="0"/>
-            <a:alphaOff val="0"/>
-          </a:schemeClr>
-        </a:solidFill>
-        <a:ln w="15875" cap="flat" cmpd="sng" algn="ctr">
-          <a:solidFill>
-            <a:schemeClr val="accent2">
-              <a:hueOff val="39038"/>
-              <a:satOff val="-26876"/>
-              <a:lumOff val="-6863"/>
               <a:alphaOff val="0"/>
             </a:schemeClr>
           </a:solidFill>
@@ -6340,13 +6216,13 @@
             <a:buChar char="•"/>
           </a:pPr>
           <a:r>
-            <a:rPr lang="en-US" sz="1000" kern="1200"/>
+            <a:rPr lang="en-US" sz="1000" kern="1200" dirty="0"/>
             <a:t>Private Key is (d, N)</a:t>
           </a:r>
         </a:p>
       </dsp:txBody>
       <dsp:txXfrm>
-        <a:off x="0" y="2941281"/>
+        <a:off x="0" y="2487681"/>
         <a:ext cx="6797675" cy="1606500"/>
       </dsp:txXfrm>
     </dsp:sp>
@@ -6357,7 +6233,132 @@
       </dsp:nvSpPr>
       <dsp:spPr>
         <a:xfrm>
-          <a:off x="339883" y="2793681"/>
+          <a:off x="339883" y="2340081"/>
+          <a:ext cx="4758372" cy="295200"/>
+        </a:xfrm>
+        <a:prstGeom prst="roundRect">
+          <a:avLst/>
+        </a:prstGeom>
+        <a:solidFill>
+          <a:schemeClr val="accent2">
+            <a:hueOff val="26025"/>
+            <a:satOff val="-17917"/>
+            <a:lumOff val="-4575"/>
+            <a:alphaOff val="0"/>
+          </a:schemeClr>
+        </a:solidFill>
+        <a:ln w="15875" cap="flat" cmpd="sng" algn="ctr">
+          <a:solidFill>
+            <a:schemeClr val="lt1">
+              <a:hueOff val="0"/>
+              <a:satOff val="0"/>
+              <a:lumOff val="0"/>
+              <a:alphaOff val="0"/>
+            </a:schemeClr>
+          </a:solidFill>
+          <a:prstDash val="solid"/>
+        </a:ln>
+        <a:effectLst/>
+      </dsp:spPr>
+      <dsp:style>
+        <a:lnRef idx="2">
+          <a:scrgbClr r="0" g="0" b="0"/>
+        </a:lnRef>
+        <a:fillRef idx="1">
+          <a:scrgbClr r="0" g="0" b="0"/>
+        </a:fillRef>
+        <a:effectRef idx="0">
+          <a:scrgbClr r="0" g="0" b="0"/>
+        </a:effectRef>
+        <a:fontRef idx="minor">
+          <a:schemeClr val="lt1"/>
+        </a:fontRef>
+      </dsp:style>
+      <dsp:txBody>
+        <a:bodyPr spcFirstLastPara="0" vert="horz" wrap="square" lIns="179855" tIns="0" rIns="179855" bIns="0" numCol="1" spcCol="1270" anchor="ctr" anchorCtr="0">
+          <a:noAutofit/>
+        </a:bodyPr>
+        <a:lstStyle/>
+        <a:p>
+          <a:pPr marL="0" lvl="0" indent="0" algn="l" defTabSz="444500">
+            <a:lnSpc>
+              <a:spcPct val="90000"/>
+            </a:lnSpc>
+            <a:spcBef>
+              <a:spcPct val="0"/>
+            </a:spcBef>
+            <a:spcAft>
+              <a:spcPct val="35000"/>
+            </a:spcAft>
+            <a:buNone/>
+          </a:pPr>
+          <a:r>
+            <a:rPr lang="en-US" sz="1000" kern="1200"/>
+            <a:t>Key generation</a:t>
+          </a:r>
+        </a:p>
+      </dsp:txBody>
+      <dsp:txXfrm>
+        <a:off x="354293" y="2354491"/>
+        <a:ext cx="4729552" cy="266380"/>
+      </dsp:txXfrm>
+    </dsp:sp>
+    <dsp:sp modelId="{30CAFB56-436F-4AA5-99ED-B1722B039BBC}">
+      <dsp:nvSpPr>
+        <dsp:cNvPr id="0" name=""/>
+        <dsp:cNvSpPr/>
+      </dsp:nvSpPr>
+      <dsp:spPr>
+        <a:xfrm>
+          <a:off x="0" y="4295781"/>
+          <a:ext cx="6797675" cy="252000"/>
+        </a:xfrm>
+        <a:prstGeom prst="rect">
+          <a:avLst/>
+        </a:prstGeom>
+        <a:solidFill>
+          <a:schemeClr val="lt1">
+            <a:alpha val="90000"/>
+            <a:hueOff val="0"/>
+            <a:satOff val="0"/>
+            <a:lumOff val="0"/>
+            <a:alphaOff val="0"/>
+          </a:schemeClr>
+        </a:solidFill>
+        <a:ln w="15875" cap="flat" cmpd="sng" algn="ctr">
+          <a:solidFill>
+            <a:schemeClr val="accent2">
+              <a:hueOff val="39038"/>
+              <a:satOff val="-26876"/>
+              <a:lumOff val="-6863"/>
+              <a:alphaOff val="0"/>
+            </a:schemeClr>
+          </a:solidFill>
+          <a:prstDash val="solid"/>
+        </a:ln>
+        <a:effectLst/>
+      </dsp:spPr>
+      <dsp:style>
+        <a:lnRef idx="2">
+          <a:scrgbClr r="0" g="0" b="0"/>
+        </a:lnRef>
+        <a:fillRef idx="1">
+          <a:scrgbClr r="0" g="0" b="0"/>
+        </a:fillRef>
+        <a:effectRef idx="0">
+          <a:scrgbClr r="0" g="0" b="0"/>
+        </a:effectRef>
+        <a:fontRef idx="minor"/>
+      </dsp:style>
+    </dsp:sp>
+    <dsp:sp modelId="{57014F90-1C5A-49B8-A04D-4D3425AE464C}">
+      <dsp:nvSpPr>
+        <dsp:cNvPr id="0" name=""/>
+        <dsp:cNvSpPr/>
+      </dsp:nvSpPr>
+      <dsp:spPr>
+        <a:xfrm>
+          <a:off x="339883" y="4148181"/>
           <a:ext cx="4758372" cy="295200"/>
         </a:xfrm>
         <a:prstGeom prst="roundRect">
@@ -6417,13 +6418,13 @@
             <a:buNone/>
           </a:pPr>
           <a:r>
-            <a:rPr lang="en-US" sz="1000" kern="1200"/>
-            <a:t>Key generation</a:t>
+            <a:rPr lang="en-US" sz="1000" kern="1200" dirty="0"/>
+            <a:t>Signatures Provide Authentication</a:t>
           </a:r>
         </a:p>
       </dsp:txBody>
       <dsp:txXfrm>
-        <a:off x="354293" y="2808091"/>
+        <a:off x="354293" y="4162591"/>
         <a:ext cx="4729552" cy="266380"/>
       </dsp:txXfrm>
     </dsp:sp>
@@ -12023,7 +12024,7 @@
           <a:p>
             <a:fld id="{3BD8A97F-5E07-4EA3-8A69-9602A00B9651}" type="datetimeFigureOut">
               <a:rPr lang="en-US" smtClean="0"/>
-              <a:t>12/4/2021</a:t>
+              <a:t>12/6/2021</a:t>
             </a:fld>
             <a:endParaRPr lang="en-US"/>
           </a:p>
@@ -12231,7 +12232,7 @@
           <a:p>
             <a:fld id="{3BD8A97F-5E07-4EA3-8A69-9602A00B9651}" type="datetimeFigureOut">
               <a:rPr lang="en-US" smtClean="0"/>
-              <a:t>12/4/2021</a:t>
+              <a:t>12/6/2021</a:t>
             </a:fld>
             <a:endParaRPr lang="en-US"/>
           </a:p>
@@ -12487,7 +12488,7 @@
           <a:p>
             <a:fld id="{3BD8A97F-5E07-4EA3-8A69-9602A00B9651}" type="datetimeFigureOut">
               <a:rPr lang="en-US" smtClean="0"/>
-              <a:t>12/4/2021</a:t>
+              <a:t>12/6/2021</a:t>
             </a:fld>
             <a:endParaRPr lang="en-US"/>
           </a:p>
@@ -12661,7 +12662,7 @@
           <a:p>
             <a:fld id="{3BD8A97F-5E07-4EA3-8A69-9602A00B9651}" type="datetimeFigureOut">
               <a:rPr lang="en-US" smtClean="0"/>
-              <a:t>12/4/2021</a:t>
+              <a:t>12/6/2021</a:t>
             </a:fld>
             <a:endParaRPr lang="en-US"/>
           </a:p>
@@ -13004,7 +13005,7 @@
           <a:p>
             <a:fld id="{3BD8A97F-5E07-4EA3-8A69-9602A00B9651}" type="datetimeFigureOut">
               <a:rPr lang="en-US" smtClean="0"/>
-              <a:t>12/4/2021</a:t>
+              <a:t>12/6/2021</a:t>
             </a:fld>
             <a:endParaRPr lang="en-US"/>
           </a:p>
@@ -13279,7 +13280,7 @@
           <a:p>
             <a:fld id="{3BD8A97F-5E07-4EA3-8A69-9602A00B9651}" type="datetimeFigureOut">
               <a:rPr lang="en-US" smtClean="0"/>
-              <a:t>12/4/2021</a:t>
+              <a:t>12/6/2021</a:t>
             </a:fld>
             <a:endParaRPr lang="en-US"/>
           </a:p>
@@ -13658,7 +13659,7 @@
           <a:p>
             <a:fld id="{3BD8A97F-5E07-4EA3-8A69-9602A00B9651}" type="datetimeFigureOut">
               <a:rPr lang="en-US" smtClean="0"/>
-              <a:t>12/4/2021</a:t>
+              <a:t>12/6/2021</a:t>
             </a:fld>
             <a:endParaRPr lang="en-US"/>
           </a:p>
@@ -13776,7 +13777,7 @@
           <a:p>
             <a:fld id="{3BD8A97F-5E07-4EA3-8A69-9602A00B9651}" type="datetimeFigureOut">
               <a:rPr lang="en-US" smtClean="0"/>
-              <a:t>12/4/2021</a:t>
+              <a:t>12/6/2021</a:t>
             </a:fld>
             <a:endParaRPr lang="en-US"/>
           </a:p>
@@ -13947,7 +13948,7 @@
           <a:p>
             <a:fld id="{3BD8A97F-5E07-4EA3-8A69-9602A00B9651}" type="datetimeFigureOut">
               <a:rPr lang="en-US" smtClean="0"/>
-              <a:t>12/4/2021</a:t>
+              <a:t>12/6/2021</a:t>
             </a:fld>
             <a:endParaRPr lang="en-US"/>
           </a:p>
@@ -14301,7 +14302,7 @@
           <a:p>
             <a:fld id="{3BD8A97F-5E07-4EA3-8A69-9602A00B9651}" type="datetimeFigureOut">
               <a:rPr lang="en-US" smtClean="0"/>
-              <a:t>12/4/2021</a:t>
+              <a:t>12/6/2021</a:t>
             </a:fld>
             <a:endParaRPr lang="en-US"/>
           </a:p>
@@ -14683,7 +14684,7 @@
           <a:p>
             <a:fld id="{3BD8A97F-5E07-4EA3-8A69-9602A00B9651}" type="datetimeFigureOut">
               <a:rPr lang="en-US" smtClean="0"/>
-              <a:t>12/4/2021</a:t>
+              <a:t>12/6/2021</a:t>
             </a:fld>
             <a:endParaRPr lang="en-US"/>
           </a:p>
@@ -14970,7 +14971,7 @@
           <a:p>
             <a:fld id="{3BD8A97F-5E07-4EA3-8A69-9602A00B9651}" type="datetimeFigureOut">
               <a:rPr lang="en-US" smtClean="0"/>
-              <a:t>12/4/2021</a:t>
+              <a:t>12/6/2021</a:t>
             </a:fld>
             <a:endParaRPr lang="en-US"/>
           </a:p>
@@ -16525,7 +16526,7 @@
             <p:ph idx="1"/>
             <p:extLst>
               <p:ext uri="{D42A27DB-BD31-4B8C-83A1-F6EECF244321}">
-                <p14:modId xmlns:p14="http://schemas.microsoft.com/office/powerpoint/2010/main" val="1949934375"/>
+                <p14:modId xmlns:p14="http://schemas.microsoft.com/office/powerpoint/2010/main" val="2656602139"/>
               </p:ext>
             </p:extLst>
           </p:nvPr>
@@ -16540,6 +16541,66 @@
           </a:graphicData>
         </a:graphic>
       </p:graphicFrame>
+      <p:pic>
+        <p:nvPicPr>
+          <p:cNvPr id="4" name="Picture 3">
+            <a:extLst>
+              <a:ext uri="{FF2B5EF4-FFF2-40B4-BE49-F238E27FC236}">
+                <a16:creationId xmlns:a16="http://schemas.microsoft.com/office/drawing/2014/main" id="{7498557F-60B5-4D14-A7E6-6134D9791B83}"/>
+              </a:ext>
+            </a:extLst>
+          </p:cNvPr>
+          <p:cNvPicPr>
+            <a:picLocks noChangeAspect="1"/>
+          </p:cNvPicPr>
+          <p:nvPr/>
+        </p:nvPicPr>
+        <p:blipFill>
+          <a:blip r:embed="rId7"/>
+          <a:stretch>
+            <a:fillRect/>
+          </a:stretch>
+        </p:blipFill>
+        <p:spPr>
+          <a:xfrm>
+            <a:off x="4741863" y="5221370"/>
+            <a:ext cx="4426834" cy="1068305"/>
+          </a:xfrm>
+          <a:prstGeom prst="rect">
+            <a:avLst/>
+          </a:prstGeom>
+        </p:spPr>
+      </p:pic>
+      <p:pic>
+        <p:nvPicPr>
+          <p:cNvPr id="7" name="Picture 6">
+            <a:extLst>
+              <a:ext uri="{FF2B5EF4-FFF2-40B4-BE49-F238E27FC236}">
+                <a16:creationId xmlns:a16="http://schemas.microsoft.com/office/drawing/2014/main" id="{9F91D217-A528-439E-ADDC-1ECC9A7E1FCB}"/>
+              </a:ext>
+            </a:extLst>
+          </p:cNvPr>
+          <p:cNvPicPr>
+            <a:picLocks noChangeAspect="1"/>
+          </p:cNvPicPr>
+          <p:nvPr/>
+        </p:nvPicPr>
+        <p:blipFill>
+          <a:blip r:embed="rId8"/>
+          <a:stretch>
+            <a:fillRect/>
+          </a:stretch>
+        </p:blipFill>
+        <p:spPr>
+          <a:xfrm>
+            <a:off x="4741863" y="6289675"/>
+            <a:ext cx="3228975" cy="361950"/>
+          </a:xfrm>
+          <a:prstGeom prst="rect">
+            <a:avLst/>
+          </a:prstGeom>
+        </p:spPr>
+      </p:pic>
     </p:spTree>
     <p:extLst>
       <p:ext uri="{BB962C8B-B14F-4D97-AF65-F5344CB8AC3E}">
@@ -17339,8 +17400,108 @@
               <a:t>MD5</a:t>
             </a:r>
           </a:p>
+          <a:p>
+            <a:pPr lvl="1">
+              <a:buFont typeface="Wingdings" panose="05000000000000000000" pitchFamily="2" charset="2"/>
+              <a:buChar char="§"/>
+            </a:pPr>
+            <a:r>
+              <a:rPr lang="en-US" dirty="0"/>
+              <a:t>Generates 128 bit hash</a:t>
+            </a:r>
+          </a:p>
+          <a:p>
+            <a:pPr lvl="1">
+              <a:buFont typeface="Wingdings" panose="05000000000000000000" pitchFamily="2" charset="2"/>
+              <a:buChar char="§"/>
+            </a:pPr>
+            <a:r>
+              <a:rPr lang="en-US" dirty="0"/>
+              <a:t>Commonly used for passwords in the past</a:t>
+            </a:r>
+          </a:p>
+          <a:p>
+            <a:pPr lvl="1">
+              <a:buFont typeface="Wingdings" panose="05000000000000000000" pitchFamily="2" charset="2"/>
+              <a:buChar char="§"/>
+            </a:pPr>
+            <a:r>
+              <a:rPr lang="en-US" dirty="0"/>
+              <a:t>Collision attack and other common knowledge tools – no longer viable</a:t>
+            </a:r>
+            <a:br>
+              <a:rPr lang="en-US" dirty="0"/>
+            </a:br>
+            <a:br>
+              <a:rPr lang="en-US" dirty="0"/>
+            </a:br>
+            <a:br>
+              <a:rPr lang="en-US" dirty="0"/>
+            </a:br>
+            <a:endParaRPr lang="en-US" dirty="0"/>
+          </a:p>
+          <a:p>
+            <a:pPr>
+              <a:buFont typeface="Wingdings" panose="05000000000000000000" pitchFamily="2" charset="2"/>
+              <a:buChar char="§"/>
+            </a:pPr>
+            <a:r>
+              <a:rPr lang="en-US" dirty="0"/>
+              <a:t>SHA</a:t>
+            </a:r>
+          </a:p>
+          <a:p>
+            <a:pPr lvl="1">
+              <a:buFont typeface="Wingdings" panose="05000000000000000000" pitchFamily="2" charset="2"/>
+              <a:buChar char="§"/>
+            </a:pPr>
+            <a:r>
+              <a:rPr lang="en-US" dirty="0"/>
+              <a:t>SHA-1 is the most commonly used</a:t>
+            </a:r>
+          </a:p>
+          <a:p>
+            <a:pPr lvl="1">
+              <a:buFont typeface="Wingdings" panose="05000000000000000000" pitchFamily="2" charset="2"/>
+              <a:buChar char="§"/>
+            </a:pPr>
+            <a:r>
+              <a:rPr lang="en-US" dirty="0"/>
+              <a:t>Also no longer viable </a:t>
+            </a:r>
+          </a:p>
         </p:txBody>
       </p:sp>
+      <p:pic>
+        <p:nvPicPr>
+          <p:cNvPr id="5" name="Picture 4">
+            <a:extLst>
+              <a:ext uri="{FF2B5EF4-FFF2-40B4-BE49-F238E27FC236}">
+                <a16:creationId xmlns:a16="http://schemas.microsoft.com/office/drawing/2014/main" id="{8AFE1CDE-DE74-499D-B194-8C4D9968D811}"/>
+              </a:ext>
+            </a:extLst>
+          </p:cNvPr>
+          <p:cNvPicPr>
+            <a:picLocks noChangeAspect="1"/>
+          </p:cNvPicPr>
+          <p:nvPr/>
+        </p:nvPicPr>
+        <p:blipFill>
+          <a:blip r:embed="rId2"/>
+          <a:stretch>
+            <a:fillRect/>
+          </a:stretch>
+        </p:blipFill>
+        <p:spPr>
+          <a:xfrm>
+            <a:off x="5483803" y="3857414"/>
+            <a:ext cx="4438650" cy="2240251"/>
+          </a:xfrm>
+          <a:prstGeom prst="rect">
+            <a:avLst/>
+          </a:prstGeom>
+        </p:spPr>
+      </p:pic>
     </p:spTree>
     <p:extLst>
       <p:ext uri="{BB962C8B-B14F-4D97-AF65-F5344CB8AC3E}">
@@ -17355,6 +17516,328 @@
 </file>
 
 <file path=ppt/slides/slide17.xml><?xml version="1.0" encoding="utf-8"?>
+<p:sld xmlns:a="http://schemas.openxmlformats.org/drawingml/2006/main" xmlns:r="http://schemas.openxmlformats.org/officeDocument/2006/relationships" xmlns:p="http://schemas.openxmlformats.org/presentationml/2006/main">
+  <p:cSld>
+    <p:bg>
+      <p:bgPr>
+        <a:solidFill>
+          <a:schemeClr val="bg1"/>
+        </a:solidFill>
+        <a:effectLst/>
+      </p:bgPr>
+    </p:bg>
+    <p:spTree>
+      <p:nvGrpSpPr>
+        <p:cNvPr id="1" name=""/>
+        <p:cNvGrpSpPr/>
+        <p:nvPr/>
+      </p:nvGrpSpPr>
+      <p:grpSpPr>
+        <a:xfrm>
+          <a:off x="0" y="0"/>
+          <a:ext cx="0" cy="0"/>
+          <a:chOff x="0" y="0"/>
+          <a:chExt cx="0" cy="0"/>
+        </a:xfrm>
+      </p:grpSpPr>
+      <p:sp>
+        <p:nvSpPr>
+          <p:cNvPr id="71" name="Rectangle 70">
+            <a:extLst>
+              <a:ext uri="{FF2B5EF4-FFF2-40B4-BE49-F238E27FC236}">
+                <a16:creationId xmlns:a16="http://schemas.microsoft.com/office/drawing/2014/main" id="{AE1AF813-2D2F-4B78-9216-388AF161EDAA}"/>
+              </a:ext>
+              <a:ext uri="{C183D7F6-B498-43B3-948B-1728B52AA6E4}">
+                <adec:decorative xmlns:adec="http://schemas.microsoft.com/office/drawing/2017/decorative" val="1"/>
+              </a:ext>
+            </a:extLst>
+          </p:cNvPr>
+          <p:cNvSpPr>
+            <a:spLocks noGrp="1" noRot="1" noChangeAspect="1" noMove="1" noResize="1" noEditPoints="1" noAdjustHandles="1" noChangeArrowheads="1" noChangeShapeType="1" noTextEdit="1"/>
+          </p:cNvSpPr>
+          <p:nvPr>
+            <p:extLst>
+              <p:ext uri="{386F3935-93C4-4BCD-93E2-E3B085C9AB24}">
+                <p16:designElem xmlns:p16="http://schemas.microsoft.com/office/powerpoint/2015/main" val="1"/>
+              </p:ext>
+            </p:extLst>
+          </p:nvPr>
+        </p:nvSpPr>
+        <p:spPr>
+          <a:xfrm>
+            <a:off x="3175" y="6400800"/>
+            <a:ext cx="12188825" cy="457200"/>
+          </a:xfrm>
+          <a:prstGeom prst="rect">
+            <a:avLst/>
+          </a:prstGeom>
+          <a:solidFill>
+            <a:schemeClr val="accent2"/>
+          </a:solidFill>
+          <a:ln>
+            <a:noFill/>
+          </a:ln>
+        </p:spPr>
+        <p:style>
+          <a:lnRef idx="2">
+            <a:schemeClr val="accent1">
+              <a:shade val="50000"/>
+            </a:schemeClr>
+          </a:lnRef>
+          <a:fillRef idx="1">
+            <a:schemeClr val="accent1"/>
+          </a:fillRef>
+          <a:effectRef idx="0">
+            <a:schemeClr val="accent1"/>
+          </a:effectRef>
+          <a:fontRef idx="minor">
+            <a:schemeClr val="lt1"/>
+          </a:fontRef>
+        </p:style>
+      </p:sp>
+      <p:sp>
+        <p:nvSpPr>
+          <p:cNvPr id="73" name="Rectangle 72">
+            <a:extLst>
+              <a:ext uri="{FF2B5EF4-FFF2-40B4-BE49-F238E27FC236}">
+                <a16:creationId xmlns:a16="http://schemas.microsoft.com/office/drawing/2014/main" id="{C47181D2-95D5-4439-9BDF-14D4FDC7BD80}"/>
+              </a:ext>
+              <a:ext uri="{C183D7F6-B498-43B3-948B-1728B52AA6E4}">
+                <adec:decorative xmlns:adec="http://schemas.microsoft.com/office/drawing/2017/decorative" val="1"/>
+              </a:ext>
+            </a:extLst>
+          </p:cNvPr>
+          <p:cNvSpPr>
+            <a:spLocks noGrp="1" noRot="1" noChangeAspect="1" noMove="1" noResize="1" noEditPoints="1" noAdjustHandles="1" noChangeArrowheads="1" noChangeShapeType="1" noTextEdit="1"/>
+          </p:cNvSpPr>
+          <p:nvPr>
+            <p:extLst>
+              <p:ext uri="{386F3935-93C4-4BCD-93E2-E3B085C9AB24}">
+                <p16:designElem xmlns:p16="http://schemas.microsoft.com/office/powerpoint/2015/main" val="1"/>
+              </p:ext>
+            </p:extLst>
+          </p:nvPr>
+        </p:nvSpPr>
+        <p:spPr>
+          <a:xfrm>
+            <a:off x="15" y="6334316"/>
+            <a:ext cx="12188825" cy="64008"/>
+          </a:xfrm>
+          <a:prstGeom prst="rect">
+            <a:avLst/>
+          </a:prstGeom>
+          <a:solidFill>
+            <a:schemeClr val="accent1"/>
+          </a:solidFill>
+          <a:ln>
+            <a:noFill/>
+          </a:ln>
+        </p:spPr>
+        <p:style>
+          <a:lnRef idx="2">
+            <a:schemeClr val="accent1">
+              <a:shade val="50000"/>
+            </a:schemeClr>
+          </a:lnRef>
+          <a:fillRef idx="1">
+            <a:schemeClr val="accent1"/>
+          </a:fillRef>
+          <a:effectRef idx="0">
+            <a:schemeClr val="accent1"/>
+          </a:effectRef>
+          <a:fontRef idx="minor">
+            <a:schemeClr val="lt1"/>
+          </a:fontRef>
+        </p:style>
+      </p:sp>
+      <p:sp>
+        <p:nvSpPr>
+          <p:cNvPr id="75" name="Rectangle 74">
+            <a:extLst>
+              <a:ext uri="{FF2B5EF4-FFF2-40B4-BE49-F238E27FC236}">
+                <a16:creationId xmlns:a16="http://schemas.microsoft.com/office/drawing/2014/main" id="{CDD85225-4221-4672-B1DE-C34BFFF5FDFA}"/>
+              </a:ext>
+              <a:ext uri="{C183D7F6-B498-43B3-948B-1728B52AA6E4}">
+                <adec:decorative xmlns:adec="http://schemas.microsoft.com/office/drawing/2017/decorative" val="1"/>
+              </a:ext>
+            </a:extLst>
+          </p:cNvPr>
+          <p:cNvSpPr>
+            <a:spLocks noGrp="1" noRot="1" noChangeAspect="1" noMove="1" noResize="1" noEditPoints="1" noAdjustHandles="1" noChangeArrowheads="1" noChangeShapeType="1" noTextEdit="1"/>
+          </p:cNvSpPr>
+          <p:nvPr>
+            <p:extLst>
+              <p:ext uri="{386F3935-93C4-4BCD-93E2-E3B085C9AB24}">
+                <p16:designElem xmlns:p16="http://schemas.microsoft.com/office/powerpoint/2015/main" val="1"/>
+              </p:ext>
+            </p:extLst>
+          </p:nvPr>
+        </p:nvSpPr>
+        <p:spPr>
+          <a:xfrm>
+            <a:off x="0" y="0"/>
+            <a:ext cx="12192000" cy="6858000"/>
+          </a:xfrm>
+          <a:prstGeom prst="rect">
+            <a:avLst/>
+          </a:prstGeom>
+          <a:solidFill>
+            <a:schemeClr val="tx1">
+              <a:lumMod val="65000"/>
+              <a:lumOff val="35000"/>
+            </a:schemeClr>
+          </a:solidFill>
+          <a:ln>
+            <a:noFill/>
+          </a:ln>
+        </p:spPr>
+        <p:style>
+          <a:lnRef idx="2">
+            <a:schemeClr val="accent1">
+              <a:shade val="50000"/>
+            </a:schemeClr>
+          </a:lnRef>
+          <a:fillRef idx="1">
+            <a:schemeClr val="accent1"/>
+          </a:fillRef>
+          <a:effectRef idx="0">
+            <a:schemeClr val="accent1"/>
+          </a:effectRef>
+          <a:fontRef idx="minor">
+            <a:schemeClr val="lt1"/>
+          </a:fontRef>
+        </p:style>
+        <p:txBody>
+          <a:bodyPr rtlCol="0" anchor="ctr"/>
+          <a:lstStyle/>
+          <a:p>
+            <a:pPr algn="ctr"/>
+            <a:endParaRPr lang="en-US"/>
+          </a:p>
+        </p:txBody>
+      </p:sp>
+      <p:pic>
+        <p:nvPicPr>
+          <p:cNvPr id="1026" name="Picture 2" descr="MD5 | Message Digest Algorithm Processor IP Core">
+            <a:extLst>
+              <a:ext uri="{FF2B5EF4-FFF2-40B4-BE49-F238E27FC236}">
+                <a16:creationId xmlns:a16="http://schemas.microsoft.com/office/drawing/2014/main" id="{6179A0E9-C42F-4EF8-99BD-5FEF73524DB5}"/>
+              </a:ext>
+            </a:extLst>
+          </p:cNvPr>
+          <p:cNvPicPr>
+            <a:picLocks noChangeAspect="1" noChangeArrowheads="1"/>
+          </p:cNvPicPr>
+          <p:nvPr/>
+        </p:nvPicPr>
+        <p:blipFill rotWithShape="1">
+          <a:blip r:embed="rId2">
+            <a:extLst>
+              <a:ext uri="{28A0092B-C50C-407E-A947-70E740481C1C}">
+                <a14:useLocalDpi xmlns:a14="http://schemas.microsoft.com/office/drawing/2010/main" val="0"/>
+              </a:ext>
+            </a:extLst>
+          </a:blip>
+          <a:srcRect t="8364" r="1" b="1"/>
+          <a:stretch/>
+        </p:blipFill>
+        <p:spPr bwMode="auto">
+          <a:xfrm>
+            <a:off x="643467" y="643467"/>
+            <a:ext cx="10905066" cy="5571066"/>
+          </a:xfrm>
+          <a:prstGeom prst="rect">
+            <a:avLst/>
+          </a:prstGeom>
+          <a:noFill/>
+          <a:extLst>
+            <a:ext uri="{909E8E84-426E-40DD-AFC4-6F175D3DCCD1}">
+              <a14:hiddenFill xmlns:a14="http://schemas.microsoft.com/office/drawing/2010/main">
+                <a:solidFill>
+                  <a:srgbClr val="FFFFFF"/>
+                </a:solidFill>
+              </a14:hiddenFill>
+            </a:ext>
+          </a:extLst>
+        </p:spPr>
+      </p:pic>
+      <p:sp>
+        <p:nvSpPr>
+          <p:cNvPr id="77" name="Rectangle 76">
+            <a:extLst>
+              <a:ext uri="{FF2B5EF4-FFF2-40B4-BE49-F238E27FC236}">
+                <a16:creationId xmlns:a16="http://schemas.microsoft.com/office/drawing/2014/main" id="{6FB55C46-EDB8-4EC2-AD52-94B111D3A956}"/>
+              </a:ext>
+              <a:ext uri="{C183D7F6-B498-43B3-948B-1728B52AA6E4}">
+                <adec:decorative xmlns:adec="http://schemas.microsoft.com/office/drawing/2017/decorative" val="1"/>
+              </a:ext>
+            </a:extLst>
+          </p:cNvPr>
+          <p:cNvSpPr>
+            <a:spLocks noGrp="1" noRot="1" noChangeAspect="1" noMove="1" noResize="1" noEditPoints="1" noAdjustHandles="1" noChangeArrowheads="1" noChangeShapeType="1" noTextEdit="1"/>
+          </p:cNvSpPr>
+          <p:nvPr>
+            <p:extLst>
+              <p:ext uri="{386F3935-93C4-4BCD-93E2-E3B085C9AB24}">
+                <p16:designElem xmlns:p16="http://schemas.microsoft.com/office/powerpoint/2015/main" val="1"/>
+              </p:ext>
+            </p:extLst>
+          </p:nvPr>
+        </p:nvSpPr>
+        <p:spPr>
+          <a:xfrm>
+            <a:off x="477012" y="480060"/>
+            <a:ext cx="11237976" cy="5897880"/>
+          </a:xfrm>
+          <a:prstGeom prst="rect">
+            <a:avLst/>
+          </a:prstGeom>
+          <a:noFill/>
+          <a:ln>
+            <a:solidFill>
+              <a:srgbClr val="FFFFFF"/>
+            </a:solidFill>
+          </a:ln>
+        </p:spPr>
+        <p:style>
+          <a:lnRef idx="2">
+            <a:schemeClr val="accent1">
+              <a:shade val="50000"/>
+            </a:schemeClr>
+          </a:lnRef>
+          <a:fillRef idx="1">
+            <a:schemeClr val="accent1"/>
+          </a:fillRef>
+          <a:effectRef idx="0">
+            <a:schemeClr val="accent1"/>
+          </a:effectRef>
+          <a:fontRef idx="minor">
+            <a:schemeClr val="lt1"/>
+          </a:fontRef>
+        </p:style>
+        <p:txBody>
+          <a:bodyPr rtlCol="0" anchor="ctr"/>
+          <a:lstStyle/>
+          <a:p>
+            <a:pPr algn="ctr"/>
+            <a:endParaRPr lang="en-US"/>
+          </a:p>
+        </p:txBody>
+      </p:sp>
+    </p:spTree>
+    <p:extLst>
+      <p:ext uri="{BB962C8B-B14F-4D97-AF65-F5344CB8AC3E}">
+        <p14:creationId xmlns:p14="http://schemas.microsoft.com/office/powerpoint/2010/main" val="4146688812"/>
+      </p:ext>
+    </p:extLst>
+  </p:cSld>
+  <p:clrMapOvr>
+    <a:masterClrMapping/>
+  </p:clrMapOvr>
+</p:sld>
+</file>
+
+<file path=ppt/slides/slide18.xml><?xml version="1.0" encoding="utf-8"?>
 <p:sld xmlns:a="http://schemas.openxmlformats.org/drawingml/2006/main" xmlns:r="http://schemas.openxmlformats.org/officeDocument/2006/relationships" xmlns:p="http://schemas.openxmlformats.org/presentationml/2006/main">
   <p:cSld>
     <p:spTree>
@@ -17394,7 +17877,7 @@
           <a:p>
             <a:r>
               <a:rPr lang="en-US" dirty="0"/>
-              <a:t>References	</a:t>
+              <a:t>References &amp; Special Thanks	</a:t>
             </a:r>
           </a:p>
         </p:txBody>
@@ -17422,7 +17905,23 @@
           <a:p>
             <a:r>
               <a:rPr lang="en-US" dirty="0"/>
+              <a:t>References</a:t>
+            </a:r>
+          </a:p>
+          <a:p>
+            <a:pPr lvl="1"/>
+            <a:r>
+              <a:rPr lang="en-US" dirty="0"/>
               <a:t>Inspired by SEED Laboratory</a:t>
+            </a:r>
+          </a:p>
+          <a:p>
+            <a:pPr lvl="1"/>
+            <a:r>
+              <a:rPr lang="en-US" sz="1600" b="0" i="1" u="none" strike="noStrike" baseline="0" dirty="0">
+                <a:latin typeface="LMMono10-Italic"/>
+              </a:rPr>
+              <a:t>Computer Security: Principles and Practice</a:t>
             </a:r>
           </a:p>
           <a:p>
@@ -17430,7 +17929,24 @@
               <a:rPr lang="en-US" sz="1800" b="0" i="1" u="none" strike="noStrike" baseline="0" dirty="0">
                 <a:latin typeface="LMMono10-Italic"/>
               </a:rPr>
-              <a:t>Computer Security: Principles and Practice</a:t>
+              <a:t>Special thanks </a:t>
+            </a:r>
+          </a:p>
+          <a:p>
+            <a:pPr marL="201168" lvl="1" indent="0">
+              <a:buNone/>
+            </a:pPr>
+            <a:r>
+              <a:rPr lang="en-US" sz="1600" i="1" dirty="0">
+                <a:latin typeface="LMMono10-Italic"/>
+              </a:rPr>
+              <a:t>	</a:t>
+            </a:r>
+            <a:r>
+              <a:rPr lang="en-US" sz="1600" b="0" i="1" u="none" strike="noStrike" baseline="0" dirty="0">
+                <a:latin typeface="LMMono10-Italic"/>
+              </a:rPr>
+              <a:t>to Alfred for his support</a:t>
             </a:r>
           </a:p>
           <a:p>

</xml_diff>